<commit_message>
Add new strategty for optimization parameters and graphs for first run and ru n second time with new P
</commit_message>
<xml_diff>
--- a/Khuisainov MaxCut Presentation.pptx
+++ b/Khuisainov MaxCut Presentation.pptx
@@ -11,10 +11,10 @@
     <p:sldMasterId id="2147483697" r:id="rId7"/>
   </p:sldMasterIdLst>
   <p:notesMasterIdLst>
-    <p:notesMasterId r:id="rId21"/>
+    <p:notesMasterId r:id="rId23"/>
   </p:notesMasterIdLst>
   <p:handoutMasterIdLst>
-    <p:handoutMasterId r:id="rId22"/>
+    <p:handoutMasterId r:id="rId24"/>
   </p:handoutMasterIdLst>
   <p:sldIdLst>
     <p:sldId id="424" r:id="rId8"/>
@@ -30,6 +30,8 @@
     <p:sldId id="434" r:id="rId18"/>
     <p:sldId id="435" r:id="rId19"/>
     <p:sldId id="436" r:id="rId20"/>
+    <p:sldId id="438" r:id="rId21"/>
+    <p:sldId id="437" r:id="rId22"/>
   </p:sldIdLst>
   <p:sldSz cx="9144000" cy="5143500" type="screen16x9"/>
   <p:notesSz cx="9925050" cy="6665913"/>
@@ -313,7 +315,7 @@
               <a:pPr>
                 <a:defRPr/>
               </a:pPr>
-              <a:t>01/12/2024</a:t>
+              <a:t>04/12/2024</a:t>
             </a:fld>
             <a:endParaRPr lang="en-GB" dirty="0"/>
           </a:p>
@@ -532,7 +534,7 @@
               <a:pPr>
                 <a:defRPr/>
               </a:pPr>
-              <a:t>01/12/2024</a:t>
+              <a:t>04/12/2024</a:t>
             </a:fld>
             <a:endParaRPr lang="en-GB"/>
           </a:p>
@@ -11989,19 +11991,17 @@
       </p:sp>
       <p:pic>
         <p:nvPicPr>
-          <p:cNvPr id="19" name="Inhaltsplatzhalter 18">
+          <p:cNvPr id="2" name="Grafik 1">
             <a:extLst>
               <a:ext uri="{FF2B5EF4-FFF2-40B4-BE49-F238E27FC236}">
-                <a16:creationId xmlns:a16="http://schemas.microsoft.com/office/drawing/2014/main" id="{84FC5605-3CF3-8B7E-D60A-44906A79D487}"/>
+                <a16:creationId xmlns:a16="http://schemas.microsoft.com/office/drawing/2014/main" id="{3459D57E-F532-1345-5043-B40922F01287}"/>
               </a:ext>
             </a:extLst>
           </p:cNvPr>
           <p:cNvPicPr>
-            <a:picLocks noGrp="1" noChangeAspect="1"/>
+            <a:picLocks noChangeAspect="1"/>
           </p:cNvPicPr>
-          <p:nvPr>
-            <p:ph idx="1"/>
-          </p:nvPr>
+          <p:nvPr/>
         </p:nvPicPr>
         <p:blipFill>
           <a:blip r:embed="rId2"/>
@@ -12011,17 +12011,20 @@
         </p:blipFill>
         <p:spPr>
           <a:xfrm>
-            <a:off x="155801" y="779541"/>
-            <a:ext cx="8560498" cy="2375820"/>
+            <a:off x="1241378" y="3155361"/>
+            <a:ext cx="6079721" cy="1414714"/>
           </a:xfrm>
+          <a:prstGeom prst="rect">
+            <a:avLst/>
+          </a:prstGeom>
         </p:spPr>
       </p:pic>
       <p:pic>
         <p:nvPicPr>
-          <p:cNvPr id="2" name="Grafik 1">
+          <p:cNvPr id="9" name="Grafik 8">
             <a:extLst>
               <a:ext uri="{FF2B5EF4-FFF2-40B4-BE49-F238E27FC236}">
-                <a16:creationId xmlns:a16="http://schemas.microsoft.com/office/drawing/2014/main" id="{3459D57E-F532-1345-5043-B40922F01287}"/>
+                <a16:creationId xmlns:a16="http://schemas.microsoft.com/office/drawing/2014/main" id="{A5047F39-429E-7FC1-7105-1842E639FF01}"/>
               </a:ext>
             </a:extLst>
           </p:cNvPr>
@@ -12038,8 +12041,8 @@
         </p:blipFill>
         <p:spPr>
           <a:xfrm>
-            <a:off x="1241378" y="3155361"/>
-            <a:ext cx="6079721" cy="1414714"/>
+            <a:off x="319090" y="818776"/>
+            <a:ext cx="8011035" cy="2167900"/>
           </a:xfrm>
           <a:prstGeom prst="rect">
             <a:avLst/>
@@ -13219,18 +13222,7 @@
               <a:rPr lang="de-DE" dirty="0" err="1"/>
               <a:t>simulation</a:t>
             </a:r>
-            <a:r>
-              <a:rPr lang="de-DE" dirty="0"/>
-              <a:t> </a:t>
-            </a:r>
-            <a:r>
-              <a:rPr lang="de-DE" dirty="0" err="1"/>
-              <a:t>exponentially</a:t>
-            </a:r>
-            <a:r>
-              <a:rPr lang="de-DE" dirty="0"/>
-              <a:t> </a:t>
-            </a:r>
+            <a:endParaRPr lang="de-DE" dirty="0"/>
           </a:p>
           <a:p>
             <a:pPr marL="285750" indent="-285750">
@@ -13238,12 +13230,8 @@
               <a:buChar char="•"/>
             </a:pPr>
             <a:r>
-              <a:rPr lang="de-DE" dirty="0"/>
-              <a:t>I will </a:t>
-            </a:r>
-            <a:r>
               <a:rPr lang="de-DE" dirty="0" err="1"/>
-              <a:t>use</a:t>
+              <a:t>Increasing</a:t>
             </a:r>
             <a:r>
               <a:rPr lang="de-DE" dirty="0"/>
@@ -13251,7 +13239,7 @@
             </a:r>
             <a:r>
               <a:rPr lang="de-DE" dirty="0" err="1"/>
-              <a:t>random</a:t>
+              <a:t>number</a:t>
             </a:r>
             <a:r>
               <a:rPr lang="de-DE" dirty="0"/>
@@ -13259,11 +13247,75 @@
             </a:r>
             <a:r>
               <a:rPr lang="de-DE" dirty="0" err="1"/>
-              <a:t>generator</a:t>
-            </a:r>
-            <a:r>
-              <a:rPr lang="de-DE" dirty="0"/>
-              <a:t> </a:t>
+              <a:t>of</a:t>
+            </a:r>
+            <a:r>
+              <a:rPr lang="de-DE" dirty="0"/>
+              <a:t> </a:t>
+            </a:r>
+            <a:r>
+              <a:rPr lang="de-DE" dirty="0" err="1"/>
+              <a:t>nodes</a:t>
+            </a:r>
+            <a:r>
+              <a:rPr lang="de-DE" dirty="0"/>
+              <a:t> in </a:t>
+            </a:r>
+            <a:r>
+              <a:rPr lang="de-DE" dirty="0" err="1"/>
+              <a:t>graph</a:t>
+            </a:r>
+            <a:r>
+              <a:rPr lang="de-DE" dirty="0"/>
+              <a:t> by </a:t>
+            </a:r>
+            <a:r>
+              <a:rPr lang="de-DE" dirty="0" err="1"/>
+              <a:t>one</a:t>
+            </a:r>
+            <a:r>
+              <a:rPr lang="de-DE" dirty="0"/>
+              <a:t> </a:t>
+            </a:r>
+            <a:r>
+              <a:rPr lang="de-DE" dirty="0" err="1"/>
+              <a:t>increases</a:t>
+            </a:r>
+            <a:r>
+              <a:rPr lang="de-DE" dirty="0"/>
+              <a:t> </a:t>
+            </a:r>
+            <a:r>
+              <a:rPr lang="de-DE" dirty="0" err="1"/>
+              <a:t>number</a:t>
+            </a:r>
+            <a:r>
+              <a:rPr lang="de-DE" dirty="0"/>
+              <a:t> </a:t>
+            </a:r>
+            <a:r>
+              <a:rPr lang="de-DE" dirty="0" err="1"/>
+              <a:t>of</a:t>
+            </a:r>
+            <a:r>
+              <a:rPr lang="de-DE" dirty="0"/>
+              <a:t> </a:t>
+            </a:r>
+            <a:r>
+              <a:rPr lang="de-DE" dirty="0" err="1"/>
+              <a:t>qubits</a:t>
+            </a:r>
+            <a:r>
+              <a:rPr lang="de-DE" dirty="0"/>
+              <a:t> by </a:t>
+            </a:r>
+            <a:r>
+              <a:rPr lang="de-DE" dirty="0" err="1"/>
+              <a:t>one</a:t>
+            </a:r>
+            <a:r>
+              <a:rPr lang="de-DE" dirty="0"/>
+              <a:t>, but </a:t>
             </a:r>
             <a:r>
               <a:rPr lang="de-DE" dirty="0" err="1"/>
@@ -13275,7 +13327,7 @@
             </a:r>
             <a:r>
               <a:rPr lang="de-DE" dirty="0" err="1"/>
-              <a:t>start</a:t>
+              <a:t>simulation</a:t>
             </a:r>
             <a:r>
               <a:rPr lang="de-DE" dirty="0"/>
@@ -13283,7 +13335,7 @@
             </a:r>
             <a:r>
               <a:rPr lang="de-DE" dirty="0" err="1"/>
-              <a:t>optimization</a:t>
+              <a:t>it</a:t>
             </a:r>
             <a:r>
               <a:rPr lang="de-DE" dirty="0"/>
@@ -13291,15 +13343,15 @@
             </a:r>
             <a:r>
               <a:rPr lang="de-DE" dirty="0" err="1"/>
-              <a:t>values</a:t>
-            </a:r>
-            <a:r>
-              <a:rPr lang="de-DE" dirty="0"/>
-              <a:t> and „COBYLA“ </a:t>
+              <a:t>is</a:t>
+            </a:r>
+            <a:r>
+              <a:rPr lang="de-DE" dirty="0"/>
+              <a:t> a </a:t>
             </a:r>
             <a:r>
               <a:rPr lang="de-DE" dirty="0" err="1"/>
-              <a:t>as</a:t>
+              <a:t>exponentially</a:t>
             </a:r>
             <a:r>
               <a:rPr lang="de-DE" dirty="0"/>
@@ -13307,9 +13359,20 @@
             </a:r>
             <a:r>
               <a:rPr lang="de-DE" dirty="0" err="1"/>
-              <a:t>optimizer</a:t>
-            </a:r>
-            <a:endParaRPr lang="de-DE" dirty="0"/>
+              <a:t>growth</a:t>
+            </a:r>
+            <a:r>
+              <a:rPr lang="de-DE" dirty="0"/>
+              <a:t> in </a:t>
+            </a:r>
+            <a:r>
+              <a:rPr lang="de-DE" dirty="0" err="1"/>
+              <a:t>resource</a:t>
+            </a:r>
+            <a:r>
+              <a:rPr lang="de-DE" dirty="0"/>
+              <a:t> </a:t>
+            </a:r>
           </a:p>
           <a:p>
             <a:pPr marL="285750" indent="-285750">
@@ -13322,6 +13385,85 @@
             </a:r>
             <a:r>
               <a:rPr lang="de-DE" dirty="0" err="1"/>
+              <a:t>use</a:t>
+            </a:r>
+            <a:r>
+              <a:rPr lang="de-DE" dirty="0"/>
+              <a:t> </a:t>
+            </a:r>
+            <a:r>
+              <a:rPr lang="de-DE" dirty="0" err="1"/>
+              <a:t>random</a:t>
+            </a:r>
+            <a:r>
+              <a:rPr lang="de-DE" dirty="0"/>
+              <a:t> </a:t>
+            </a:r>
+            <a:r>
+              <a:rPr lang="de-DE" dirty="0" err="1"/>
+              <a:t>generator</a:t>
+            </a:r>
+            <a:r>
+              <a:rPr lang="de-DE" dirty="0"/>
+              <a:t> </a:t>
+            </a:r>
+            <a:r>
+              <a:rPr lang="de-DE" dirty="0" err="1"/>
+              <a:t>for</a:t>
+            </a:r>
+            <a:r>
+              <a:rPr lang="de-DE" dirty="0"/>
+              <a:t> </a:t>
+            </a:r>
+            <a:r>
+              <a:rPr lang="de-DE" dirty="0" err="1"/>
+              <a:t>start</a:t>
+            </a:r>
+            <a:r>
+              <a:rPr lang="de-DE" dirty="0"/>
+              <a:t> </a:t>
+            </a:r>
+            <a:r>
+              <a:rPr lang="de-DE" dirty="0" err="1"/>
+              <a:t>optimization</a:t>
+            </a:r>
+            <a:r>
+              <a:rPr lang="de-DE" dirty="0"/>
+              <a:t> </a:t>
+            </a:r>
+            <a:r>
+              <a:rPr lang="de-DE" dirty="0" err="1"/>
+              <a:t>values</a:t>
+            </a:r>
+            <a:r>
+              <a:rPr lang="de-DE" dirty="0"/>
+              <a:t> and „COBYLA“ </a:t>
+            </a:r>
+            <a:r>
+              <a:rPr lang="de-DE" dirty="0" err="1"/>
+              <a:t>as</a:t>
+            </a:r>
+            <a:r>
+              <a:rPr lang="de-DE" dirty="0"/>
+              <a:t> </a:t>
+            </a:r>
+            <a:r>
+              <a:rPr lang="de-DE" dirty="0" err="1"/>
+              <a:t>optimizer</a:t>
+            </a:r>
+            <a:endParaRPr lang="de-DE" dirty="0"/>
+          </a:p>
+          <a:p>
+            <a:pPr marL="285750" indent="-285750">
+              <a:buFont typeface="Arial" panose="020B0604020202020204" pitchFamily="34" charset="0"/>
+              <a:buChar char="•"/>
+            </a:pPr>
+            <a:r>
+              <a:rPr lang="de-DE" dirty="0"/>
+              <a:t>I will </a:t>
+            </a:r>
+            <a:r>
+              <a:rPr lang="de-DE" dirty="0" err="1"/>
               <a:t>iterate</a:t>
             </a:r>
             <a:r>
@@ -13460,6 +13602,36 @@
               <a:rPr lang="de-DE" b="1" dirty="0"/>
               <a:t>p</a:t>
             </a:r>
+          </a:p>
+          <a:p>
+            <a:pPr marL="285750" indent="-285750">
+              <a:buFont typeface="Arial" panose="020B0604020202020204" pitchFamily="34" charset="0"/>
+              <a:buChar char="•"/>
+            </a:pPr>
+            <a:r>
+              <a:rPr lang="de-DE" dirty="0"/>
+              <a:t>Graphs </a:t>
+            </a:r>
+            <a:r>
+              <a:rPr lang="de-DE" dirty="0" err="1"/>
+              <a:t>are</a:t>
+            </a:r>
+            <a:r>
+              <a:rPr lang="de-DE" dirty="0"/>
+              <a:t> </a:t>
+            </a:r>
+            <a:r>
+              <a:rPr lang="de-DE" dirty="0" err="1"/>
+              <a:t>static</a:t>
+            </a:r>
+            <a:endParaRPr lang="de-DE" dirty="0"/>
+          </a:p>
+          <a:p>
+            <a:pPr marL="285750" indent="-285750">
+              <a:buFont typeface="Arial" panose="020B0604020202020204" pitchFamily="34" charset="0"/>
+              <a:buChar char="•"/>
+            </a:pPr>
+            <a:endParaRPr lang="de-DE" b="1" dirty="0"/>
           </a:p>
         </p:txBody>
       </p:sp>
@@ -13655,6 +13827,1423 @@
     <p:extLst>
       <p:ext uri="{BB962C8B-B14F-4D97-AF65-F5344CB8AC3E}">
         <p14:creationId xmlns:p14="http://schemas.microsoft.com/office/powerpoint/2010/main" val="3116376344"/>
+      </p:ext>
+    </p:extLst>
+  </p:cSld>
+  <p:clrMapOvr>
+    <a:masterClrMapping/>
+  </p:clrMapOvr>
+</p:sld>
+</file>
+
+<file path=ppt/slides/slide14.xml><?xml version="1.0" encoding="utf-8"?>
+<p:sld xmlns:a="http://schemas.openxmlformats.org/drawingml/2006/main" xmlns:r="http://schemas.openxmlformats.org/officeDocument/2006/relationships" xmlns:p="http://schemas.openxmlformats.org/presentationml/2006/main">
+  <p:cSld>
+    <p:spTree>
+      <p:nvGrpSpPr>
+        <p:cNvPr id="1" name="">
+          <a:extLst>
+            <a:ext uri="{FF2B5EF4-FFF2-40B4-BE49-F238E27FC236}">
+              <a16:creationId xmlns:a16="http://schemas.microsoft.com/office/drawing/2014/main" id="{A6474467-1C10-A0E6-7B40-FB61E5CA8F49}"/>
+            </a:ext>
+          </a:extLst>
+        </p:cNvPr>
+        <p:cNvGrpSpPr/>
+        <p:nvPr/>
+      </p:nvGrpSpPr>
+      <p:grpSpPr>
+        <a:xfrm>
+          <a:off x="0" y="0"/>
+          <a:ext cx="0" cy="0"/>
+          <a:chOff x="0" y="0"/>
+          <a:chExt cx="0" cy="0"/>
+        </a:xfrm>
+      </p:grpSpPr>
+      <p:sp>
+        <p:nvSpPr>
+          <p:cNvPr id="2" name="Inhaltsplatzhalter 1">
+            <a:extLst>
+              <a:ext uri="{FF2B5EF4-FFF2-40B4-BE49-F238E27FC236}">
+                <a16:creationId xmlns:a16="http://schemas.microsoft.com/office/drawing/2014/main" id="{26131F84-3291-58CB-F433-0136F42F0DE7}"/>
+              </a:ext>
+            </a:extLst>
+          </p:cNvPr>
+          <p:cNvSpPr>
+            <a:spLocks noGrp="1"/>
+          </p:cNvSpPr>
+          <p:nvPr>
+            <p:ph idx="1"/>
+          </p:nvPr>
+        </p:nvSpPr>
+        <p:spPr>
+          <a:xfrm>
+            <a:off x="319090" y="1291525"/>
+            <a:ext cx="8508999" cy="3394775"/>
+          </a:xfrm>
+        </p:spPr>
+        <p:txBody>
+          <a:bodyPr/>
+          <a:lstStyle/>
+          <a:p>
+            <a:r>
+              <a:rPr lang="de-DE" dirty="0" err="1"/>
+              <a:t>Important</a:t>
+            </a:r>
+            <a:r>
+              <a:rPr lang="de-DE" dirty="0"/>
+              <a:t>: </a:t>
+            </a:r>
+          </a:p>
+          <a:p>
+            <a:pPr marL="285750" indent="-285750">
+              <a:buFont typeface="Arial" panose="020B0604020202020204" pitchFamily="34" charset="0"/>
+              <a:buChar char="•"/>
+            </a:pPr>
+            <a:r>
+              <a:rPr lang="de-DE" dirty="0" err="1"/>
+              <a:t>increasing</a:t>
+            </a:r>
+            <a:r>
+              <a:rPr lang="de-DE" dirty="0"/>
+              <a:t> </a:t>
+            </a:r>
+            <a:r>
+              <a:rPr lang="de-DE" dirty="0" err="1"/>
+              <a:t>number</a:t>
+            </a:r>
+            <a:r>
+              <a:rPr lang="de-DE" dirty="0"/>
+              <a:t> </a:t>
+            </a:r>
+            <a:r>
+              <a:rPr lang="de-DE" dirty="0" err="1"/>
+              <a:t>of</a:t>
+            </a:r>
+            <a:r>
+              <a:rPr lang="de-DE" dirty="0"/>
+              <a:t> </a:t>
+            </a:r>
+            <a:r>
+              <a:rPr lang="de-DE" b="1" dirty="0"/>
+              <a:t>p</a:t>
+            </a:r>
+            <a:r>
+              <a:rPr lang="de-DE" dirty="0"/>
+              <a:t> </a:t>
+            </a:r>
+            <a:r>
+              <a:rPr lang="de-DE" dirty="0" err="1"/>
+              <a:t>increases</a:t>
+            </a:r>
+            <a:r>
+              <a:rPr lang="de-DE" dirty="0"/>
+              <a:t> </a:t>
+            </a:r>
+            <a:r>
+              <a:rPr lang="de-DE" dirty="0" err="1"/>
+              <a:t>resource</a:t>
+            </a:r>
+            <a:r>
+              <a:rPr lang="de-DE" dirty="0"/>
+              <a:t> </a:t>
+            </a:r>
+            <a:r>
+              <a:rPr lang="de-DE" dirty="0" err="1"/>
+              <a:t>usage</a:t>
+            </a:r>
+            <a:r>
+              <a:rPr lang="de-DE" dirty="0"/>
+              <a:t> </a:t>
+            </a:r>
+            <a:r>
+              <a:rPr lang="de-DE" dirty="0" err="1"/>
+              <a:t>of</a:t>
+            </a:r>
+            <a:r>
+              <a:rPr lang="de-DE" dirty="0"/>
+              <a:t> </a:t>
+            </a:r>
+            <a:r>
+              <a:rPr lang="de-DE" dirty="0" err="1"/>
+              <a:t>simulation</a:t>
+            </a:r>
+            <a:endParaRPr lang="de-DE" dirty="0"/>
+          </a:p>
+          <a:p>
+            <a:pPr marL="285750" indent="-285750">
+              <a:buFont typeface="Arial" panose="020B0604020202020204" pitchFamily="34" charset="0"/>
+              <a:buChar char="•"/>
+            </a:pPr>
+            <a:r>
+              <a:rPr lang="de-DE" dirty="0" err="1"/>
+              <a:t>Increasing</a:t>
+            </a:r>
+            <a:r>
+              <a:rPr lang="de-DE" dirty="0"/>
+              <a:t> </a:t>
+            </a:r>
+            <a:r>
+              <a:rPr lang="de-DE" dirty="0" err="1"/>
+              <a:t>number</a:t>
+            </a:r>
+            <a:r>
+              <a:rPr lang="de-DE" dirty="0"/>
+              <a:t> </a:t>
+            </a:r>
+            <a:r>
+              <a:rPr lang="de-DE" dirty="0" err="1"/>
+              <a:t>of</a:t>
+            </a:r>
+            <a:r>
+              <a:rPr lang="de-DE" dirty="0"/>
+              <a:t> </a:t>
+            </a:r>
+            <a:r>
+              <a:rPr lang="de-DE" dirty="0" err="1"/>
+              <a:t>nodes</a:t>
+            </a:r>
+            <a:r>
+              <a:rPr lang="de-DE" dirty="0"/>
+              <a:t> in </a:t>
+            </a:r>
+            <a:r>
+              <a:rPr lang="de-DE" dirty="0" err="1"/>
+              <a:t>graph</a:t>
+            </a:r>
+            <a:r>
+              <a:rPr lang="de-DE" dirty="0"/>
+              <a:t> by </a:t>
+            </a:r>
+            <a:r>
+              <a:rPr lang="de-DE" dirty="0" err="1"/>
+              <a:t>one</a:t>
+            </a:r>
+            <a:r>
+              <a:rPr lang="de-DE" dirty="0"/>
+              <a:t> </a:t>
+            </a:r>
+            <a:r>
+              <a:rPr lang="de-DE" dirty="0" err="1"/>
+              <a:t>increases</a:t>
+            </a:r>
+            <a:r>
+              <a:rPr lang="de-DE" dirty="0"/>
+              <a:t> </a:t>
+            </a:r>
+            <a:r>
+              <a:rPr lang="de-DE" dirty="0" err="1"/>
+              <a:t>number</a:t>
+            </a:r>
+            <a:r>
+              <a:rPr lang="de-DE" dirty="0"/>
+              <a:t> </a:t>
+            </a:r>
+            <a:r>
+              <a:rPr lang="de-DE" dirty="0" err="1"/>
+              <a:t>of</a:t>
+            </a:r>
+            <a:r>
+              <a:rPr lang="de-DE" dirty="0"/>
+              <a:t> </a:t>
+            </a:r>
+            <a:r>
+              <a:rPr lang="de-DE" dirty="0" err="1"/>
+              <a:t>qubits</a:t>
+            </a:r>
+            <a:r>
+              <a:rPr lang="de-DE" dirty="0"/>
+              <a:t> by </a:t>
+            </a:r>
+            <a:r>
+              <a:rPr lang="de-DE" dirty="0" err="1"/>
+              <a:t>one</a:t>
+            </a:r>
+            <a:r>
+              <a:rPr lang="de-DE" dirty="0"/>
+              <a:t>, but </a:t>
+            </a:r>
+            <a:r>
+              <a:rPr lang="de-DE" dirty="0" err="1"/>
+              <a:t>for</a:t>
+            </a:r>
+            <a:r>
+              <a:rPr lang="de-DE" dirty="0"/>
+              <a:t> </a:t>
+            </a:r>
+            <a:r>
+              <a:rPr lang="de-DE" dirty="0" err="1"/>
+              <a:t>simulation</a:t>
+            </a:r>
+            <a:r>
+              <a:rPr lang="de-DE" dirty="0"/>
+              <a:t> </a:t>
+            </a:r>
+            <a:r>
+              <a:rPr lang="de-DE" dirty="0" err="1"/>
+              <a:t>it</a:t>
+            </a:r>
+            <a:r>
+              <a:rPr lang="de-DE" dirty="0"/>
+              <a:t> </a:t>
+            </a:r>
+            <a:r>
+              <a:rPr lang="de-DE" dirty="0" err="1"/>
+              <a:t>is</a:t>
+            </a:r>
+            <a:r>
+              <a:rPr lang="de-DE" dirty="0"/>
+              <a:t> a </a:t>
+            </a:r>
+            <a:r>
+              <a:rPr lang="de-DE" dirty="0" err="1"/>
+              <a:t>exponentially</a:t>
+            </a:r>
+            <a:r>
+              <a:rPr lang="de-DE" dirty="0"/>
+              <a:t> </a:t>
+            </a:r>
+            <a:r>
+              <a:rPr lang="de-DE" dirty="0" err="1"/>
+              <a:t>growth</a:t>
+            </a:r>
+            <a:r>
+              <a:rPr lang="de-DE" dirty="0"/>
+              <a:t> in </a:t>
+            </a:r>
+            <a:r>
+              <a:rPr lang="de-DE" dirty="0" err="1"/>
+              <a:t>resource</a:t>
+            </a:r>
+            <a:r>
+              <a:rPr lang="de-DE" dirty="0"/>
+              <a:t> </a:t>
+            </a:r>
+          </a:p>
+          <a:p>
+            <a:pPr marL="285750" indent="-285750">
+              <a:buFont typeface="Arial" panose="020B0604020202020204" pitchFamily="34" charset="0"/>
+              <a:buChar char="•"/>
+            </a:pPr>
+            <a:r>
+              <a:rPr lang="de-DE" dirty="0"/>
+              <a:t>I will </a:t>
+            </a:r>
+            <a:r>
+              <a:rPr lang="de-DE" dirty="0" err="1"/>
+              <a:t>use</a:t>
+            </a:r>
+            <a:r>
+              <a:rPr lang="de-DE" dirty="0"/>
+              <a:t> </a:t>
+            </a:r>
+            <a:r>
+              <a:rPr lang="de-DE" dirty="0" err="1"/>
+              <a:t>random</a:t>
+            </a:r>
+            <a:r>
+              <a:rPr lang="de-DE" dirty="0"/>
+              <a:t> </a:t>
+            </a:r>
+            <a:r>
+              <a:rPr lang="de-DE" dirty="0" err="1"/>
+              <a:t>generator</a:t>
+            </a:r>
+            <a:r>
+              <a:rPr lang="de-DE" dirty="0"/>
+              <a:t> </a:t>
+            </a:r>
+            <a:r>
+              <a:rPr lang="de-DE" dirty="0" err="1"/>
+              <a:t>for</a:t>
+            </a:r>
+            <a:r>
+              <a:rPr lang="de-DE" dirty="0"/>
+              <a:t> </a:t>
+            </a:r>
+            <a:r>
+              <a:rPr lang="de-DE" dirty="0" err="1"/>
+              <a:t>start</a:t>
+            </a:r>
+            <a:r>
+              <a:rPr lang="de-DE" dirty="0"/>
+              <a:t> </a:t>
+            </a:r>
+            <a:r>
+              <a:rPr lang="de-DE" dirty="0" err="1"/>
+              <a:t>optimization</a:t>
+            </a:r>
+            <a:r>
+              <a:rPr lang="de-DE" dirty="0"/>
+              <a:t> </a:t>
+            </a:r>
+            <a:r>
+              <a:rPr lang="de-DE" dirty="0" err="1"/>
+              <a:t>values</a:t>
+            </a:r>
+            <a:r>
+              <a:rPr lang="de-DE" dirty="0"/>
+              <a:t> and „COBYLA“ </a:t>
+            </a:r>
+            <a:r>
+              <a:rPr lang="de-DE" dirty="0" err="1"/>
+              <a:t>as</a:t>
+            </a:r>
+            <a:r>
+              <a:rPr lang="de-DE" dirty="0"/>
+              <a:t> </a:t>
+            </a:r>
+            <a:r>
+              <a:rPr lang="de-DE" dirty="0" err="1"/>
+              <a:t>optimizer</a:t>
+            </a:r>
+            <a:endParaRPr lang="de-DE" dirty="0"/>
+          </a:p>
+          <a:p>
+            <a:pPr marL="285750" indent="-285750">
+              <a:buFont typeface="Arial" panose="020B0604020202020204" pitchFamily="34" charset="0"/>
+              <a:buChar char="•"/>
+            </a:pPr>
+            <a:r>
+              <a:rPr lang="de-DE" dirty="0"/>
+              <a:t>I will </a:t>
+            </a:r>
+            <a:r>
+              <a:rPr lang="de-DE" dirty="0" err="1"/>
+              <a:t>iterate</a:t>
+            </a:r>
+            <a:r>
+              <a:rPr lang="de-DE" dirty="0"/>
+              <a:t> </a:t>
+            </a:r>
+            <a:r>
+              <a:rPr lang="de-DE" dirty="0" err="1"/>
+              <a:t>over</a:t>
+            </a:r>
+            <a:r>
+              <a:rPr lang="de-DE" dirty="0"/>
+              <a:t> all possible </a:t>
+            </a:r>
+            <a:r>
+              <a:rPr lang="de-DE" dirty="0" err="1"/>
+              <a:t>values</a:t>
+            </a:r>
+            <a:r>
+              <a:rPr lang="de-DE" dirty="0"/>
+              <a:t> on </a:t>
+            </a:r>
+            <a:r>
+              <a:rPr lang="de-DE" dirty="0" err="1"/>
+              <a:t>my</a:t>
+            </a:r>
+            <a:r>
+              <a:rPr lang="de-DE" dirty="0"/>
+              <a:t> primitive </a:t>
+            </a:r>
+            <a:r>
+              <a:rPr lang="de-DE" dirty="0" err="1"/>
+              <a:t>MaxCut</a:t>
+            </a:r>
+            <a:r>
+              <a:rPr lang="de-DE" dirty="0"/>
+              <a:t> </a:t>
+            </a:r>
+            <a:r>
+              <a:rPr lang="de-DE" dirty="0" err="1"/>
+              <a:t>solver</a:t>
+            </a:r>
+            <a:r>
+              <a:rPr lang="de-DE" dirty="0"/>
+              <a:t> </a:t>
+            </a:r>
+            <a:r>
+              <a:rPr lang="de-DE" dirty="0" err="1"/>
+              <a:t>implementation</a:t>
+            </a:r>
+            <a:r>
+              <a:rPr lang="de-DE" dirty="0"/>
+              <a:t> </a:t>
+            </a:r>
+            <a:r>
+              <a:rPr lang="de-DE" dirty="0" err="1"/>
+              <a:t>to</a:t>
+            </a:r>
+            <a:r>
+              <a:rPr lang="de-DE" dirty="0"/>
+              <a:t> </a:t>
+            </a:r>
+            <a:r>
+              <a:rPr lang="de-DE" dirty="0" err="1"/>
+              <a:t>get</a:t>
+            </a:r>
+            <a:r>
+              <a:rPr lang="de-DE" dirty="0"/>
+              <a:t> </a:t>
+            </a:r>
+            <a:r>
+              <a:rPr lang="de-DE" dirty="0" err="1"/>
+              <a:t>the</a:t>
+            </a:r>
+            <a:r>
+              <a:rPr lang="de-DE" dirty="0"/>
+              <a:t> </a:t>
+            </a:r>
+            <a:r>
+              <a:rPr lang="de-DE" dirty="0" err="1"/>
+              <a:t>best</a:t>
+            </a:r>
+            <a:r>
+              <a:rPr lang="de-DE" dirty="0"/>
+              <a:t> </a:t>
+            </a:r>
+            <a:r>
+              <a:rPr lang="de-DE" dirty="0" err="1"/>
+              <a:t>solution</a:t>
+            </a:r>
+            <a:r>
+              <a:rPr lang="de-DE" dirty="0"/>
+              <a:t> and </a:t>
+            </a:r>
+            <a:r>
+              <a:rPr lang="de-DE" dirty="0" err="1"/>
+              <a:t>to</a:t>
+            </a:r>
+            <a:r>
+              <a:rPr lang="de-DE" dirty="0"/>
+              <a:t> </a:t>
+            </a:r>
+            <a:r>
+              <a:rPr lang="de-DE" dirty="0" err="1"/>
+              <a:t>compare</a:t>
+            </a:r>
+            <a:r>
+              <a:rPr lang="de-DE" dirty="0"/>
+              <a:t> </a:t>
+            </a:r>
+            <a:r>
+              <a:rPr lang="de-DE" dirty="0" err="1"/>
+              <a:t>it</a:t>
+            </a:r>
+            <a:r>
+              <a:rPr lang="de-DE" dirty="0"/>
+              <a:t> </a:t>
+            </a:r>
+            <a:r>
+              <a:rPr lang="de-DE" dirty="0" err="1"/>
+              <a:t>with</a:t>
+            </a:r>
+            <a:r>
+              <a:rPr lang="de-DE" dirty="0"/>
+              <a:t> QAOA </a:t>
+            </a:r>
+            <a:r>
+              <a:rPr lang="de-DE" dirty="0" err="1"/>
+              <a:t>result</a:t>
+            </a:r>
+            <a:r>
+              <a:rPr lang="de-DE" dirty="0"/>
+              <a:t> on different </a:t>
+            </a:r>
+            <a:r>
+              <a:rPr lang="de-DE" b="1" dirty="0"/>
+              <a:t>p</a:t>
+            </a:r>
+          </a:p>
+          <a:p>
+            <a:pPr marL="285750" indent="-285750">
+              <a:buFont typeface="Arial" panose="020B0604020202020204" pitchFamily="34" charset="0"/>
+              <a:buChar char="•"/>
+            </a:pPr>
+            <a:r>
+              <a:rPr lang="de-DE" dirty="0"/>
+              <a:t>Graphs </a:t>
+            </a:r>
+            <a:r>
+              <a:rPr lang="de-DE" dirty="0" err="1"/>
+              <a:t>are</a:t>
+            </a:r>
+            <a:r>
+              <a:rPr lang="de-DE" dirty="0"/>
+              <a:t> </a:t>
+            </a:r>
+            <a:r>
+              <a:rPr lang="de-DE" dirty="0" err="1"/>
+              <a:t>static</a:t>
+            </a:r>
+            <a:endParaRPr lang="de-DE" dirty="0"/>
+          </a:p>
+        </p:txBody>
+      </p:sp>
+      <p:sp>
+        <p:nvSpPr>
+          <p:cNvPr id="3" name="Foliennummernplatzhalter 2">
+            <a:extLst>
+              <a:ext uri="{FF2B5EF4-FFF2-40B4-BE49-F238E27FC236}">
+                <a16:creationId xmlns:a16="http://schemas.microsoft.com/office/drawing/2014/main" id="{EFEC5F3A-4997-2D06-1A43-0D33B1B9DF60}"/>
+              </a:ext>
+            </a:extLst>
+          </p:cNvPr>
+          <p:cNvSpPr>
+            <a:spLocks noGrp="1"/>
+          </p:cNvSpPr>
+          <p:nvPr>
+            <p:ph type="sldNum" sz="quarter" idx="11"/>
+          </p:nvPr>
+        </p:nvSpPr>
+        <p:spPr/>
+        <p:txBody>
+          <a:bodyPr/>
+          <a:lstStyle/>
+          <a:p>
+            <a:fld id="{CE58CB1E-F828-4F11-99E0-327109AF9DA4}" type="slidenum">
+              <a:rPr lang="de-DE" smtClean="0"/>
+              <a:pPr/>
+              <a:t>14</a:t>
+            </a:fld>
+            <a:endParaRPr lang="de-DE" dirty="0"/>
+          </a:p>
+        </p:txBody>
+      </p:sp>
+      <p:sp>
+        <p:nvSpPr>
+          <p:cNvPr id="4" name="Fußzeilenplatzhalter 3">
+            <a:extLst>
+              <a:ext uri="{FF2B5EF4-FFF2-40B4-BE49-F238E27FC236}">
+                <a16:creationId xmlns:a16="http://schemas.microsoft.com/office/drawing/2014/main" id="{1440090B-6437-01E2-3AD7-D2590070C0D9}"/>
+              </a:ext>
+            </a:extLst>
+          </p:cNvPr>
+          <p:cNvSpPr>
+            <a:spLocks noGrp="1"/>
+          </p:cNvSpPr>
+          <p:nvPr>
+            <p:ph type="ftr" sz="quarter" idx="12"/>
+          </p:nvPr>
+        </p:nvSpPr>
+        <p:spPr/>
+        <p:txBody>
+          <a:bodyPr/>
+          <a:lstStyle/>
+          <a:p>
+            <a:r>
+              <a:rPr lang="de-DE" dirty="0"/>
+              <a:t>Emil Khusainov B.SC Computer Science (TUM)</a:t>
+            </a:r>
+            <a:endParaRPr lang="en-US" dirty="0"/>
+          </a:p>
+        </p:txBody>
+      </p:sp>
+      <p:sp>
+        <p:nvSpPr>
+          <p:cNvPr id="6" name="Titel 5">
+            <a:extLst>
+              <a:ext uri="{FF2B5EF4-FFF2-40B4-BE49-F238E27FC236}">
+                <a16:creationId xmlns:a16="http://schemas.microsoft.com/office/drawing/2014/main" id="{DFAE7388-4868-3B0F-49DA-5588AECB5F6D}"/>
+              </a:ext>
+            </a:extLst>
+          </p:cNvPr>
+          <p:cNvSpPr>
+            <a:spLocks noGrp="1"/>
+          </p:cNvSpPr>
+          <p:nvPr>
+            <p:ph type="title"/>
+          </p:nvPr>
+        </p:nvSpPr>
+        <p:spPr>
+          <a:xfrm>
+            <a:off x="311163" y="293459"/>
+            <a:ext cx="7897774" cy="791179"/>
+          </a:xfrm>
+        </p:spPr>
+        <p:txBody>
+          <a:bodyPr/>
+          <a:lstStyle/>
+          <a:p>
+            <a:r>
+              <a:rPr lang="de-DE" dirty="0" err="1"/>
+              <a:t>Let‘s</a:t>
+            </a:r>
+            <a:r>
+              <a:rPr lang="de-DE" dirty="0"/>
+              <a:t> </a:t>
+            </a:r>
+            <a:r>
+              <a:rPr lang="de-DE" dirty="0" err="1"/>
+              <a:t>see</a:t>
+            </a:r>
+            <a:r>
+              <a:rPr lang="de-DE" dirty="0"/>
+              <a:t> on </a:t>
+            </a:r>
+            <a:r>
+              <a:rPr lang="de-DE" dirty="0" err="1"/>
+              <a:t>example</a:t>
+            </a:r>
+            <a:r>
+              <a:rPr lang="de-DE" dirty="0"/>
+              <a:t> </a:t>
+            </a:r>
+            <a:r>
+              <a:rPr lang="de-DE" dirty="0" err="1"/>
+              <a:t>graphs</a:t>
+            </a:r>
+            <a:r>
+              <a:rPr lang="de-DE" dirty="0"/>
+              <a:t>, </a:t>
+            </a:r>
+            <a:r>
+              <a:rPr lang="de-DE" dirty="0" err="1"/>
+              <a:t>how</a:t>
+            </a:r>
+            <a:r>
+              <a:rPr lang="de-DE" dirty="0"/>
+              <a:t> </a:t>
+            </a:r>
+            <a:r>
+              <a:rPr lang="de-DE" dirty="0" err="1"/>
+              <a:t>the</a:t>
+            </a:r>
+            <a:r>
+              <a:rPr lang="de-DE" dirty="0"/>
+              <a:t> </a:t>
+            </a:r>
+            <a:r>
+              <a:rPr lang="de-DE" dirty="0" err="1"/>
+              <a:t>solution</a:t>
+            </a:r>
+            <a:r>
+              <a:rPr lang="de-DE" dirty="0"/>
+              <a:t> </a:t>
+            </a:r>
+            <a:r>
+              <a:rPr lang="de-DE" dirty="0" err="1"/>
+              <a:t>from</a:t>
+            </a:r>
+            <a:r>
+              <a:rPr lang="de-DE" dirty="0"/>
+              <a:t> QAOA </a:t>
+            </a:r>
+            <a:r>
+              <a:rPr lang="de-DE" dirty="0" err="1"/>
+              <a:t>differs</a:t>
+            </a:r>
+            <a:r>
+              <a:rPr lang="de-DE" dirty="0"/>
+              <a:t> </a:t>
+            </a:r>
+            <a:r>
+              <a:rPr lang="de-DE" dirty="0" err="1"/>
+              <a:t>from</a:t>
+            </a:r>
+            <a:r>
+              <a:rPr lang="de-DE" dirty="0"/>
+              <a:t> </a:t>
+            </a:r>
+            <a:r>
+              <a:rPr lang="de-DE" dirty="0" err="1"/>
+              <a:t>the</a:t>
+            </a:r>
+            <a:r>
+              <a:rPr lang="de-DE" dirty="0"/>
+              <a:t> </a:t>
+            </a:r>
+            <a:r>
+              <a:rPr lang="de-DE" dirty="0" err="1"/>
+              <a:t>best</a:t>
+            </a:r>
+            <a:r>
+              <a:rPr lang="de-DE" dirty="0"/>
+              <a:t> by different </a:t>
+            </a:r>
+            <a:r>
+              <a:rPr lang="de-DE" b="1" dirty="0"/>
+              <a:t>p</a:t>
+            </a:r>
+          </a:p>
+        </p:txBody>
+      </p:sp>
+      <p:sp>
+        <p:nvSpPr>
+          <p:cNvPr id="7" name="Textfeld 6">
+            <a:extLst>
+              <a:ext uri="{FF2B5EF4-FFF2-40B4-BE49-F238E27FC236}">
+                <a16:creationId xmlns:a16="http://schemas.microsoft.com/office/drawing/2014/main" id="{24F3396C-27CB-1D29-EC90-27BDBB458342}"/>
+              </a:ext>
+            </a:extLst>
+          </p:cNvPr>
+          <p:cNvSpPr txBox="1"/>
+          <p:nvPr/>
+        </p:nvSpPr>
+        <p:spPr>
+          <a:xfrm>
+            <a:off x="3228971" y="3832964"/>
+            <a:ext cx="4572000" cy="369332"/>
+          </a:xfrm>
+          <a:prstGeom prst="rect">
+            <a:avLst/>
+          </a:prstGeom>
+          <a:noFill/>
+        </p:spPr>
+        <p:txBody>
+          <a:bodyPr wrap="square">
+            <a:spAutoFit/>
+          </a:bodyPr>
+          <a:lstStyle/>
+          <a:p>
+            <a:r>
+              <a:rPr lang="de-DE" dirty="0"/>
+              <a:t>Here </a:t>
+            </a:r>
+            <a:r>
+              <a:rPr lang="de-DE" dirty="0" err="1"/>
+              <a:t>are</a:t>
+            </a:r>
+            <a:r>
+              <a:rPr lang="de-DE" dirty="0"/>
+              <a:t> </a:t>
+            </a:r>
+            <a:r>
+              <a:rPr lang="de-DE" dirty="0" err="1"/>
+              <a:t>my</a:t>
+            </a:r>
+            <a:r>
+              <a:rPr lang="de-DE" dirty="0"/>
+              <a:t> Graphs</a:t>
+            </a:r>
+          </a:p>
+        </p:txBody>
+      </p:sp>
+    </p:spTree>
+    <p:extLst>
+      <p:ext uri="{BB962C8B-B14F-4D97-AF65-F5344CB8AC3E}">
+        <p14:creationId xmlns:p14="http://schemas.microsoft.com/office/powerpoint/2010/main" val="4165144399"/>
+      </p:ext>
+    </p:extLst>
+  </p:cSld>
+  <p:clrMapOvr>
+    <a:masterClrMapping/>
+  </p:clrMapOvr>
+</p:sld>
+</file>
+
+<file path=ppt/slides/slide15.xml><?xml version="1.0" encoding="utf-8"?>
+<p:sld xmlns:a="http://schemas.openxmlformats.org/drawingml/2006/main" xmlns:r="http://schemas.openxmlformats.org/officeDocument/2006/relationships" xmlns:p="http://schemas.openxmlformats.org/presentationml/2006/main">
+  <p:cSld>
+    <p:spTree>
+      <p:nvGrpSpPr>
+        <p:cNvPr id="1" name=""/>
+        <p:cNvGrpSpPr/>
+        <p:nvPr/>
+      </p:nvGrpSpPr>
+      <p:grpSpPr>
+        <a:xfrm>
+          <a:off x="0" y="0"/>
+          <a:ext cx="0" cy="0"/>
+          <a:chOff x="0" y="0"/>
+          <a:chExt cx="0" cy="0"/>
+        </a:xfrm>
+      </p:grpSpPr>
+      <p:sp>
+        <p:nvSpPr>
+          <p:cNvPr id="3" name="Foliennummernplatzhalter 2">
+            <a:extLst>
+              <a:ext uri="{FF2B5EF4-FFF2-40B4-BE49-F238E27FC236}">
+                <a16:creationId xmlns:a16="http://schemas.microsoft.com/office/drawing/2014/main" id="{8FD6D993-E039-C878-87BD-2FF373CC80A5}"/>
+              </a:ext>
+            </a:extLst>
+          </p:cNvPr>
+          <p:cNvSpPr>
+            <a:spLocks noGrp="1"/>
+          </p:cNvSpPr>
+          <p:nvPr>
+            <p:ph type="sldNum" sz="quarter" idx="11"/>
+          </p:nvPr>
+        </p:nvSpPr>
+        <p:spPr/>
+        <p:txBody>
+          <a:bodyPr/>
+          <a:lstStyle/>
+          <a:p>
+            <a:fld id="{CE58CB1E-F828-4F11-99E0-327109AF9DA4}" type="slidenum">
+              <a:rPr lang="de-DE" smtClean="0"/>
+              <a:pPr/>
+              <a:t>15</a:t>
+            </a:fld>
+            <a:endParaRPr lang="de-DE" dirty="0"/>
+          </a:p>
+        </p:txBody>
+      </p:sp>
+      <p:sp>
+        <p:nvSpPr>
+          <p:cNvPr id="4" name="Fußzeilenplatzhalter 3">
+            <a:extLst>
+              <a:ext uri="{FF2B5EF4-FFF2-40B4-BE49-F238E27FC236}">
+                <a16:creationId xmlns:a16="http://schemas.microsoft.com/office/drawing/2014/main" id="{408D94F5-79C3-9BD2-EF1E-5793BA3A5DBC}"/>
+              </a:ext>
+            </a:extLst>
+          </p:cNvPr>
+          <p:cNvSpPr>
+            <a:spLocks noGrp="1"/>
+          </p:cNvSpPr>
+          <p:nvPr>
+            <p:ph type="ftr" sz="quarter" idx="12"/>
+          </p:nvPr>
+        </p:nvSpPr>
+        <p:spPr/>
+        <p:txBody>
+          <a:bodyPr/>
+          <a:lstStyle/>
+          <a:p>
+            <a:r>
+              <a:rPr lang="de-DE" dirty="0"/>
+              <a:t>Emil Khusainov B.SC Computer Science (TUM)</a:t>
+            </a:r>
+            <a:endParaRPr lang="en-US" dirty="0"/>
+          </a:p>
+        </p:txBody>
+      </p:sp>
+      <p:pic>
+        <p:nvPicPr>
+          <p:cNvPr id="12" name="Inhaltsplatzhalter 11" descr="Ein Bild, das Screenshot, Reihe enthält.&#10;&#10;Automatisch generierte Beschreibung">
+            <a:extLst>
+              <a:ext uri="{FF2B5EF4-FFF2-40B4-BE49-F238E27FC236}">
+                <a16:creationId xmlns:a16="http://schemas.microsoft.com/office/drawing/2014/main" id="{3F20B971-0ADA-AB81-ACB4-8AC442CB8664}"/>
+              </a:ext>
+            </a:extLst>
+          </p:cNvPr>
+          <p:cNvPicPr>
+            <a:picLocks noGrp="1" noChangeAspect="1"/>
+          </p:cNvPicPr>
+          <p:nvPr>
+            <p:ph idx="1"/>
+          </p:nvPr>
+        </p:nvPicPr>
+        <p:blipFill>
+          <a:blip r:embed="rId2"/>
+          <a:stretch>
+            <a:fillRect/>
+          </a:stretch>
+        </p:blipFill>
+        <p:spPr>
+          <a:xfrm>
+            <a:off x="0" y="14671"/>
+            <a:ext cx="1434770" cy="1076078"/>
+          </a:xfrm>
+        </p:spPr>
+      </p:pic>
+      <p:pic>
+        <p:nvPicPr>
+          <p:cNvPr id="14" name="Grafik 13" descr="Ein Bild, das Reihe enthält.&#10;&#10;Automatisch generierte Beschreibung">
+            <a:extLst>
+              <a:ext uri="{FF2B5EF4-FFF2-40B4-BE49-F238E27FC236}">
+                <a16:creationId xmlns:a16="http://schemas.microsoft.com/office/drawing/2014/main" id="{04BD1D62-2CBA-57F0-FCFE-F1ABC55CD290}"/>
+              </a:ext>
+            </a:extLst>
+          </p:cNvPr>
+          <p:cNvPicPr>
+            <a:picLocks noChangeAspect="1"/>
+          </p:cNvPicPr>
+          <p:nvPr/>
+        </p:nvPicPr>
+        <p:blipFill>
+          <a:blip r:embed="rId3"/>
+          <a:stretch>
+            <a:fillRect/>
+          </a:stretch>
+        </p:blipFill>
+        <p:spPr>
+          <a:xfrm>
+            <a:off x="1363575" y="14671"/>
+            <a:ext cx="1434771" cy="1076078"/>
+          </a:xfrm>
+          <a:prstGeom prst="rect">
+            <a:avLst/>
+          </a:prstGeom>
+        </p:spPr>
+      </p:pic>
+      <p:pic>
+        <p:nvPicPr>
+          <p:cNvPr id="16" name="Grafik 15" descr="Ein Bild, das Reihe, Dreieck enthält.&#10;&#10;Automatisch generierte Beschreibung">
+            <a:extLst>
+              <a:ext uri="{FF2B5EF4-FFF2-40B4-BE49-F238E27FC236}">
+                <a16:creationId xmlns:a16="http://schemas.microsoft.com/office/drawing/2014/main" id="{F02084C2-CAC3-E730-FCB4-ED41D0F4F20A}"/>
+              </a:ext>
+            </a:extLst>
+          </p:cNvPr>
+          <p:cNvPicPr>
+            <a:picLocks noChangeAspect="1"/>
+          </p:cNvPicPr>
+          <p:nvPr/>
+        </p:nvPicPr>
+        <p:blipFill>
+          <a:blip r:embed="rId4"/>
+          <a:stretch>
+            <a:fillRect/>
+          </a:stretch>
+        </p:blipFill>
+        <p:spPr>
+          <a:xfrm>
+            <a:off x="2727150" y="14671"/>
+            <a:ext cx="1434771" cy="1076078"/>
+          </a:xfrm>
+          <a:prstGeom prst="rect">
+            <a:avLst/>
+          </a:prstGeom>
+        </p:spPr>
+      </p:pic>
+      <p:pic>
+        <p:nvPicPr>
+          <p:cNvPr id="18" name="Grafik 17" descr="Ein Bild, das Reihe, Kreis, Diagramm enthält.&#10;&#10;Automatisch generierte Beschreibung">
+            <a:extLst>
+              <a:ext uri="{FF2B5EF4-FFF2-40B4-BE49-F238E27FC236}">
+                <a16:creationId xmlns:a16="http://schemas.microsoft.com/office/drawing/2014/main" id="{9A4CFBF6-6BE1-1B1C-5A13-C106559D1BD9}"/>
+              </a:ext>
+            </a:extLst>
+          </p:cNvPr>
+          <p:cNvPicPr>
+            <a:picLocks noChangeAspect="1"/>
+          </p:cNvPicPr>
+          <p:nvPr/>
+        </p:nvPicPr>
+        <p:blipFill>
+          <a:blip r:embed="rId5"/>
+          <a:stretch>
+            <a:fillRect/>
+          </a:stretch>
+        </p:blipFill>
+        <p:spPr>
+          <a:xfrm>
+            <a:off x="4161921" y="14671"/>
+            <a:ext cx="1434771" cy="1076078"/>
+          </a:xfrm>
+          <a:prstGeom prst="rect">
+            <a:avLst/>
+          </a:prstGeom>
+        </p:spPr>
+      </p:pic>
+      <p:pic>
+        <p:nvPicPr>
+          <p:cNvPr id="20" name="Grafik 19" descr="Ein Bild, das Reihe, Kreis, Diagramm enthält.&#10;&#10;Automatisch generierte Beschreibung">
+            <a:extLst>
+              <a:ext uri="{FF2B5EF4-FFF2-40B4-BE49-F238E27FC236}">
+                <a16:creationId xmlns:a16="http://schemas.microsoft.com/office/drawing/2014/main" id="{9A8F3E34-39C0-024A-31E8-21847E7AF472}"/>
+              </a:ext>
+            </a:extLst>
+          </p:cNvPr>
+          <p:cNvPicPr>
+            <a:picLocks noChangeAspect="1"/>
+          </p:cNvPicPr>
+          <p:nvPr/>
+        </p:nvPicPr>
+        <p:blipFill>
+          <a:blip r:embed="rId6"/>
+          <a:stretch>
+            <a:fillRect/>
+          </a:stretch>
+        </p:blipFill>
+        <p:spPr>
+          <a:xfrm>
+            <a:off x="5596692" y="14671"/>
+            <a:ext cx="1434771" cy="1076078"/>
+          </a:xfrm>
+          <a:prstGeom prst="rect">
+            <a:avLst/>
+          </a:prstGeom>
+        </p:spPr>
+      </p:pic>
+      <p:pic>
+        <p:nvPicPr>
+          <p:cNvPr id="22" name="Grafik 21" descr="Ein Bild, das Reihe, Kreis, Design enthält.&#10;&#10;Automatisch generierte Beschreibung">
+            <a:extLst>
+              <a:ext uri="{FF2B5EF4-FFF2-40B4-BE49-F238E27FC236}">
+                <a16:creationId xmlns:a16="http://schemas.microsoft.com/office/drawing/2014/main" id="{FC5FB27A-07E3-C80F-5254-5749EF5C5634}"/>
+              </a:ext>
+            </a:extLst>
+          </p:cNvPr>
+          <p:cNvPicPr>
+            <a:picLocks noChangeAspect="1"/>
+          </p:cNvPicPr>
+          <p:nvPr/>
+        </p:nvPicPr>
+        <p:blipFill>
+          <a:blip r:embed="rId7"/>
+          <a:stretch>
+            <a:fillRect/>
+          </a:stretch>
+        </p:blipFill>
+        <p:spPr>
+          <a:xfrm>
+            <a:off x="0" y="1090749"/>
+            <a:ext cx="1434772" cy="1076079"/>
+          </a:xfrm>
+          <a:prstGeom prst="rect">
+            <a:avLst/>
+          </a:prstGeom>
+        </p:spPr>
+      </p:pic>
+      <p:pic>
+        <p:nvPicPr>
+          <p:cNvPr id="24" name="Grafik 23" descr="Ein Bild, das Reihe, Kreis, Design enthält.&#10;&#10;Automatisch generierte Beschreibung">
+            <a:extLst>
+              <a:ext uri="{FF2B5EF4-FFF2-40B4-BE49-F238E27FC236}">
+                <a16:creationId xmlns:a16="http://schemas.microsoft.com/office/drawing/2014/main" id="{2D9081D1-E5E7-649D-9248-E558EA94CCDA}"/>
+              </a:ext>
+            </a:extLst>
+          </p:cNvPr>
+          <p:cNvPicPr>
+            <a:picLocks noChangeAspect="1"/>
+          </p:cNvPicPr>
+          <p:nvPr/>
+        </p:nvPicPr>
+        <p:blipFill>
+          <a:blip r:embed="rId8"/>
+          <a:stretch>
+            <a:fillRect/>
+          </a:stretch>
+        </p:blipFill>
+        <p:spPr>
+          <a:xfrm>
+            <a:off x="1434770" y="1090749"/>
+            <a:ext cx="1434772" cy="1076079"/>
+          </a:xfrm>
+          <a:prstGeom prst="rect">
+            <a:avLst/>
+          </a:prstGeom>
+        </p:spPr>
+      </p:pic>
+      <p:pic>
+        <p:nvPicPr>
+          <p:cNvPr id="26" name="Grafik 25" descr="Ein Bild, das Reihe, Diagramm, Kreis, Screenshot enthält.&#10;&#10;Automatisch generierte Beschreibung">
+            <a:extLst>
+              <a:ext uri="{FF2B5EF4-FFF2-40B4-BE49-F238E27FC236}">
+                <a16:creationId xmlns:a16="http://schemas.microsoft.com/office/drawing/2014/main" id="{317921F8-A13A-AB7F-0CFB-4595C5E2A22B}"/>
+              </a:ext>
+            </a:extLst>
+          </p:cNvPr>
+          <p:cNvPicPr>
+            <a:picLocks noChangeAspect="1"/>
+          </p:cNvPicPr>
+          <p:nvPr/>
+        </p:nvPicPr>
+        <p:blipFill>
+          <a:blip r:embed="rId9"/>
+          <a:stretch>
+            <a:fillRect/>
+          </a:stretch>
+        </p:blipFill>
+        <p:spPr>
+          <a:xfrm>
+            <a:off x="2798343" y="1052175"/>
+            <a:ext cx="1434773" cy="1076080"/>
+          </a:xfrm>
+          <a:prstGeom prst="rect">
+            <a:avLst/>
+          </a:prstGeom>
+        </p:spPr>
+      </p:pic>
+      <p:pic>
+        <p:nvPicPr>
+          <p:cNvPr id="28" name="Grafik 27" descr="Ein Bild, das Reihe, Kreis, Diagramm, Design enthält.&#10;&#10;Automatisch generierte Beschreibung">
+            <a:extLst>
+              <a:ext uri="{FF2B5EF4-FFF2-40B4-BE49-F238E27FC236}">
+                <a16:creationId xmlns:a16="http://schemas.microsoft.com/office/drawing/2014/main" id="{AC2AE52D-5D51-DB21-BC29-B93FF8AD7DE5}"/>
+              </a:ext>
+            </a:extLst>
+          </p:cNvPr>
+          <p:cNvPicPr>
+            <a:picLocks noChangeAspect="1"/>
+          </p:cNvPicPr>
+          <p:nvPr/>
+        </p:nvPicPr>
+        <p:blipFill>
+          <a:blip r:embed="rId10"/>
+          <a:stretch>
+            <a:fillRect/>
+          </a:stretch>
+        </p:blipFill>
+        <p:spPr>
+          <a:xfrm>
+            <a:off x="4197518" y="1090749"/>
+            <a:ext cx="1434773" cy="1076080"/>
+          </a:xfrm>
+          <a:prstGeom prst="rect">
+            <a:avLst/>
+          </a:prstGeom>
+        </p:spPr>
+      </p:pic>
+      <p:pic>
+        <p:nvPicPr>
+          <p:cNvPr id="30" name="Grafik 29" descr="Ein Bild, das Reihe, Diagramm, Kreis enthält.&#10;&#10;Automatisch generierte Beschreibung">
+            <a:extLst>
+              <a:ext uri="{FF2B5EF4-FFF2-40B4-BE49-F238E27FC236}">
+                <a16:creationId xmlns:a16="http://schemas.microsoft.com/office/drawing/2014/main" id="{A6848B4D-30FA-97ED-1435-8DF4834147B2}"/>
+              </a:ext>
+            </a:extLst>
+          </p:cNvPr>
+          <p:cNvPicPr>
+            <a:picLocks noChangeAspect="1"/>
+          </p:cNvPicPr>
+          <p:nvPr/>
+        </p:nvPicPr>
+        <p:blipFill>
+          <a:blip r:embed="rId11"/>
+          <a:stretch>
+            <a:fillRect/>
+          </a:stretch>
+        </p:blipFill>
+        <p:spPr>
+          <a:xfrm>
+            <a:off x="5561092" y="1022168"/>
+            <a:ext cx="1434775" cy="1076081"/>
+          </a:xfrm>
+          <a:prstGeom prst="rect">
+            <a:avLst/>
+          </a:prstGeom>
+        </p:spPr>
+      </p:pic>
+      <p:pic>
+        <p:nvPicPr>
+          <p:cNvPr id="32" name="Grafik 31" descr="Ein Bild, das Reihe, Diagramm, Kreis, Design enthält.&#10;&#10;Automatisch generierte Beschreibung">
+            <a:extLst>
+              <a:ext uri="{FF2B5EF4-FFF2-40B4-BE49-F238E27FC236}">
+                <a16:creationId xmlns:a16="http://schemas.microsoft.com/office/drawing/2014/main" id="{0131D605-041A-F089-C393-66F08ACB84F8}"/>
+              </a:ext>
+            </a:extLst>
+          </p:cNvPr>
+          <p:cNvPicPr>
+            <a:picLocks noChangeAspect="1"/>
+          </p:cNvPicPr>
+          <p:nvPr/>
+        </p:nvPicPr>
+        <p:blipFill>
+          <a:blip r:embed="rId12"/>
+          <a:stretch>
+            <a:fillRect/>
+          </a:stretch>
+        </p:blipFill>
+        <p:spPr>
+          <a:xfrm>
+            <a:off x="71194" y="2166827"/>
+            <a:ext cx="1434775" cy="1076081"/>
+          </a:xfrm>
+          <a:prstGeom prst="rect">
+            <a:avLst/>
+          </a:prstGeom>
+        </p:spPr>
+      </p:pic>
+      <p:pic>
+        <p:nvPicPr>
+          <p:cNvPr id="34" name="Grafik 33" descr="Ein Bild, das Reihe, Kreis, Diagramm enthält.&#10;&#10;Automatisch generierte Beschreibung">
+            <a:extLst>
+              <a:ext uri="{FF2B5EF4-FFF2-40B4-BE49-F238E27FC236}">
+                <a16:creationId xmlns:a16="http://schemas.microsoft.com/office/drawing/2014/main" id="{CE8F528E-03E5-EDC1-9675-63139A2D1407}"/>
+              </a:ext>
+            </a:extLst>
+          </p:cNvPr>
+          <p:cNvPicPr>
+            <a:picLocks noChangeAspect="1"/>
+          </p:cNvPicPr>
+          <p:nvPr/>
+        </p:nvPicPr>
+        <p:blipFill>
+          <a:blip r:embed="rId13"/>
+          <a:stretch>
+            <a:fillRect/>
+          </a:stretch>
+        </p:blipFill>
+        <p:spPr>
+          <a:xfrm>
+            <a:off x="1399171" y="2128253"/>
+            <a:ext cx="1434773" cy="1076080"/>
+          </a:xfrm>
+          <a:prstGeom prst="rect">
+            <a:avLst/>
+          </a:prstGeom>
+        </p:spPr>
+      </p:pic>
+      <p:pic>
+        <p:nvPicPr>
+          <p:cNvPr id="36" name="Grafik 35" descr="Ein Bild, das Reihe, Diagramm, Kreis enthält.&#10;&#10;Automatisch generierte Beschreibung">
+            <a:extLst>
+              <a:ext uri="{FF2B5EF4-FFF2-40B4-BE49-F238E27FC236}">
+                <a16:creationId xmlns:a16="http://schemas.microsoft.com/office/drawing/2014/main" id="{F94241BC-0E64-4EC8-AFBA-2E382A4351D0}"/>
+              </a:ext>
+            </a:extLst>
+          </p:cNvPr>
+          <p:cNvPicPr>
+            <a:picLocks noChangeAspect="1"/>
+          </p:cNvPicPr>
+          <p:nvPr/>
+        </p:nvPicPr>
+        <p:blipFill>
+          <a:blip r:embed="rId14"/>
+          <a:stretch>
+            <a:fillRect/>
+          </a:stretch>
+        </p:blipFill>
+        <p:spPr>
+          <a:xfrm>
+            <a:off x="2833942" y="2089678"/>
+            <a:ext cx="1434775" cy="1076081"/>
+          </a:xfrm>
+          <a:prstGeom prst="rect">
+            <a:avLst/>
+          </a:prstGeom>
+        </p:spPr>
+      </p:pic>
+      <p:pic>
+        <p:nvPicPr>
+          <p:cNvPr id="38" name="Grafik 37" descr="Ein Bild, das Reihe, Kreis, Diagramm, Design enthält.&#10;&#10;Automatisch generierte Beschreibung">
+            <a:extLst>
+              <a:ext uri="{FF2B5EF4-FFF2-40B4-BE49-F238E27FC236}">
+                <a16:creationId xmlns:a16="http://schemas.microsoft.com/office/drawing/2014/main" id="{EE5655BF-A6F0-9942-41D5-9A24380D6912}"/>
+              </a:ext>
+            </a:extLst>
+          </p:cNvPr>
+          <p:cNvPicPr>
+            <a:picLocks noChangeAspect="1"/>
+          </p:cNvPicPr>
+          <p:nvPr/>
+        </p:nvPicPr>
+        <p:blipFill>
+          <a:blip r:embed="rId15"/>
+          <a:stretch>
+            <a:fillRect/>
+          </a:stretch>
+        </p:blipFill>
+        <p:spPr>
+          <a:xfrm>
+            <a:off x="4314385" y="2029664"/>
+            <a:ext cx="1434776" cy="1076082"/>
+          </a:xfrm>
+          <a:prstGeom prst="rect">
+            <a:avLst/>
+          </a:prstGeom>
+        </p:spPr>
+      </p:pic>
+      <p:pic>
+        <p:nvPicPr>
+          <p:cNvPr id="40" name="Grafik 39" descr="Ein Bild, das Reihe, Kreis, Diagramm, Symmetrie enthält.&#10;&#10;Automatisch generierte Beschreibung">
+            <a:extLst>
+              <a:ext uri="{FF2B5EF4-FFF2-40B4-BE49-F238E27FC236}">
+                <a16:creationId xmlns:a16="http://schemas.microsoft.com/office/drawing/2014/main" id="{192375C6-327F-B24D-47D0-11D31091E900}"/>
+              </a:ext>
+            </a:extLst>
+          </p:cNvPr>
+          <p:cNvPicPr>
+            <a:picLocks noChangeAspect="1"/>
+          </p:cNvPicPr>
+          <p:nvPr/>
+        </p:nvPicPr>
+        <p:blipFill>
+          <a:blip r:embed="rId16"/>
+          <a:stretch>
+            <a:fillRect/>
+          </a:stretch>
+        </p:blipFill>
+        <p:spPr>
+          <a:xfrm>
+            <a:off x="5749161" y="2128253"/>
+            <a:ext cx="1434775" cy="1076081"/>
+          </a:xfrm>
+          <a:prstGeom prst="rect">
+            <a:avLst/>
+          </a:prstGeom>
+        </p:spPr>
+      </p:pic>
+      <p:pic>
+        <p:nvPicPr>
+          <p:cNvPr id="42" name="Grafik 41" descr="Ein Bild, das Reihe, Kreis, Diagramm, Design enthält.&#10;&#10;Automatisch generierte Beschreibung">
+            <a:extLst>
+              <a:ext uri="{FF2B5EF4-FFF2-40B4-BE49-F238E27FC236}">
+                <a16:creationId xmlns:a16="http://schemas.microsoft.com/office/drawing/2014/main" id="{95EEDF32-31C8-101E-2FE8-3A239140CF6D}"/>
+              </a:ext>
+            </a:extLst>
+          </p:cNvPr>
+          <p:cNvPicPr>
+            <a:picLocks noChangeAspect="1"/>
+          </p:cNvPicPr>
+          <p:nvPr/>
+        </p:nvPicPr>
+        <p:blipFill>
+          <a:blip r:embed="rId17"/>
+          <a:stretch>
+            <a:fillRect/>
+          </a:stretch>
+        </p:blipFill>
+        <p:spPr>
+          <a:xfrm>
+            <a:off x="1670553" y="3226027"/>
+            <a:ext cx="1680070" cy="1260053"/>
+          </a:xfrm>
+          <a:prstGeom prst="rect">
+            <a:avLst/>
+          </a:prstGeom>
+        </p:spPr>
+      </p:pic>
+      <p:pic>
+        <p:nvPicPr>
+          <p:cNvPr id="44" name="Grafik 43" descr="Ein Bild, das Reihe, Kreis, Diagramm, Design enthält.&#10;&#10;Automatisch generierte Beschreibung">
+            <a:extLst>
+              <a:ext uri="{FF2B5EF4-FFF2-40B4-BE49-F238E27FC236}">
+                <a16:creationId xmlns:a16="http://schemas.microsoft.com/office/drawing/2014/main" id="{F3CD10E3-E675-A9BB-5DCA-211CFD1DEC05}"/>
+              </a:ext>
+            </a:extLst>
+          </p:cNvPr>
+          <p:cNvPicPr>
+            <a:picLocks noChangeAspect="1"/>
+          </p:cNvPicPr>
+          <p:nvPr/>
+        </p:nvPicPr>
+        <p:blipFill>
+          <a:blip r:embed="rId18"/>
+          <a:stretch>
+            <a:fillRect/>
+          </a:stretch>
+        </p:blipFill>
+        <p:spPr>
+          <a:xfrm>
+            <a:off x="3428682" y="3247467"/>
+            <a:ext cx="1680070" cy="1260053"/>
+          </a:xfrm>
+          <a:prstGeom prst="rect">
+            <a:avLst/>
+          </a:prstGeom>
+        </p:spPr>
+      </p:pic>
+      <p:pic>
+        <p:nvPicPr>
+          <p:cNvPr id="46" name="Grafik 45" descr="Ein Bild, das Kreis, Reihe, Diagramm, Design enthält.&#10;&#10;Automatisch generierte Beschreibung">
+            <a:extLst>
+              <a:ext uri="{FF2B5EF4-FFF2-40B4-BE49-F238E27FC236}">
+                <a16:creationId xmlns:a16="http://schemas.microsoft.com/office/drawing/2014/main" id="{84F5A661-5071-02FB-B1EE-FD418F23EF3C}"/>
+              </a:ext>
+            </a:extLst>
+          </p:cNvPr>
+          <p:cNvPicPr>
+            <a:picLocks noChangeAspect="1"/>
+          </p:cNvPicPr>
+          <p:nvPr/>
+        </p:nvPicPr>
+        <p:blipFill>
+          <a:blip r:embed="rId19"/>
+          <a:stretch>
+            <a:fillRect/>
+          </a:stretch>
+        </p:blipFill>
+        <p:spPr>
+          <a:xfrm>
+            <a:off x="5315797" y="3341015"/>
+            <a:ext cx="1680070" cy="1260053"/>
+          </a:xfrm>
+          <a:prstGeom prst="rect">
+            <a:avLst/>
+          </a:prstGeom>
+        </p:spPr>
+      </p:pic>
+    </p:spTree>
+    <p:extLst>
+      <p:ext uri="{BB962C8B-B14F-4D97-AF65-F5344CB8AC3E}">
+        <p14:creationId xmlns:p14="http://schemas.microsoft.com/office/powerpoint/2010/main" val="2829039001"/>
       </p:ext>
     </p:extLst>
   </p:cSld>
@@ -16028,35 +17617,6 @@
       </p:sp>
       <p:pic>
         <p:nvPicPr>
-          <p:cNvPr id="19" name="Inhaltsplatzhalter 18">
-            <a:extLst>
-              <a:ext uri="{FF2B5EF4-FFF2-40B4-BE49-F238E27FC236}">
-                <a16:creationId xmlns:a16="http://schemas.microsoft.com/office/drawing/2014/main" id="{4E17099A-9898-CB93-6B57-A9A12DE95DEA}"/>
-              </a:ext>
-            </a:extLst>
-          </p:cNvPr>
-          <p:cNvPicPr>
-            <a:picLocks noGrp="1" noChangeAspect="1"/>
-          </p:cNvPicPr>
-          <p:nvPr>
-            <p:ph idx="1"/>
-          </p:nvPr>
-        </p:nvPicPr>
-        <p:blipFill>
-          <a:blip r:embed="rId2"/>
-          <a:stretch>
-            <a:fillRect/>
-          </a:stretch>
-        </p:blipFill>
-        <p:spPr>
-          <a:xfrm>
-            <a:off x="155801" y="779541"/>
-            <a:ext cx="8560498" cy="2375820"/>
-          </a:xfrm>
-        </p:spPr>
-      </p:pic>
-      <p:pic>
-        <p:nvPicPr>
           <p:cNvPr id="21" name="Grafik 20" descr="Ein Bild, das Diagramm, Reihe, Plan, Design enthält.&#10;&#10;Automatisch generierte Beschreibung">
             <a:extLst>
               <a:ext uri="{FF2B5EF4-FFF2-40B4-BE49-F238E27FC236}">
@@ -16070,7 +17630,7 @@
           <p:nvPr/>
         </p:nvPicPr>
         <p:blipFill>
-          <a:blip r:embed="rId3"/>
+          <a:blip r:embed="rId2"/>
           <a:stretch>
             <a:fillRect/>
           </a:stretch>
@@ -16115,7 +17675,7 @@
           <a:p>
             <a:r>
               <a:rPr lang="de-DE" sz="800" dirty="0">
-                <a:hlinkClick r:id="rId4"/>
+                <a:hlinkClick r:id="rId3"/>
               </a:rPr>
               <a:t>https://en.wikipedia.org/wiki/Quantum_optimization_algorithms</a:t>
             </a:r>
@@ -16123,6 +17683,61 @@
           </a:p>
         </p:txBody>
       </p:sp>
+      <p:sp>
+        <p:nvSpPr>
+          <p:cNvPr id="5" name="Inhaltsplatzhalter 4">
+            <a:extLst>
+              <a:ext uri="{FF2B5EF4-FFF2-40B4-BE49-F238E27FC236}">
+                <a16:creationId xmlns:a16="http://schemas.microsoft.com/office/drawing/2014/main" id="{45A49B51-E9B4-994E-999B-0EB93DD7FFED}"/>
+              </a:ext>
+            </a:extLst>
+          </p:cNvPr>
+          <p:cNvSpPr>
+            <a:spLocks noGrp="1"/>
+          </p:cNvSpPr>
+          <p:nvPr>
+            <p:ph idx="1"/>
+          </p:nvPr>
+        </p:nvSpPr>
+        <p:spPr/>
+        <p:txBody>
+          <a:bodyPr/>
+          <a:lstStyle/>
+          <a:p>
+            <a:endParaRPr lang="de-DE" dirty="0"/>
+          </a:p>
+        </p:txBody>
+      </p:sp>
+      <p:pic>
+        <p:nvPicPr>
+          <p:cNvPr id="8" name="Grafik 7">
+            <a:extLst>
+              <a:ext uri="{FF2B5EF4-FFF2-40B4-BE49-F238E27FC236}">
+                <a16:creationId xmlns:a16="http://schemas.microsoft.com/office/drawing/2014/main" id="{BA700C09-648D-8F23-971F-7A39847FCA2C}"/>
+              </a:ext>
+            </a:extLst>
+          </p:cNvPr>
+          <p:cNvPicPr>
+            <a:picLocks noChangeAspect="1"/>
+          </p:cNvPicPr>
+          <p:nvPr/>
+        </p:nvPicPr>
+        <p:blipFill>
+          <a:blip r:embed="rId4"/>
+          <a:stretch>
+            <a:fillRect/>
+          </a:stretch>
+        </p:blipFill>
+        <p:spPr>
+          <a:xfrm>
+            <a:off x="311162" y="779042"/>
+            <a:ext cx="7769818" cy="2102624"/>
+          </a:xfrm>
+          <a:prstGeom prst="rect">
+            <a:avLst/>
+          </a:prstGeom>
+        </p:spPr>
+      </p:pic>
     </p:spTree>
     <p:extLst>
       <p:ext uri="{BB962C8B-B14F-4D97-AF65-F5344CB8AC3E}">
@@ -16616,11 +18231,11 @@
           <a:p>
             <a:r>
               <a:rPr lang="en-US" sz="1600" dirty="0"/>
-              <a:t>In almost every case :                         , where X is a Pauli-X gate for </a:t>
+              <a:t>In almost every case :                         , where omega-x is a Pauli-X gate for j-</a:t>
             </a:r>
             <a:r>
               <a:rPr lang="en-US" sz="1600" dirty="0" err="1"/>
-              <a:t>i-th</a:t>
+              <a:t>th</a:t>
             </a:r>
             <a:r>
               <a:rPr lang="en-US" sz="1600" dirty="0"/>
@@ -16643,10 +18258,10 @@
       </p:sp>
       <p:pic>
         <p:nvPicPr>
-          <p:cNvPr id="8" name="Grafik 7">
+          <p:cNvPr id="9" name="Grafik 8">
             <a:extLst>
               <a:ext uri="{FF2B5EF4-FFF2-40B4-BE49-F238E27FC236}">
-                <a16:creationId xmlns:a16="http://schemas.microsoft.com/office/drawing/2014/main" id="{B51A7793-FECD-6D42-F315-65A4E4F4AA8B}"/>
+                <a16:creationId xmlns:a16="http://schemas.microsoft.com/office/drawing/2014/main" id="{746B6F9B-B0AD-3943-2417-CECFFE23F1D1}"/>
               </a:ext>
             </a:extLst>
           </p:cNvPr>
@@ -16663,8 +18278,8 @@
         </p:blipFill>
         <p:spPr>
           <a:xfrm>
-            <a:off x="3300235" y="2164871"/>
-            <a:ext cx="2543530" cy="463319"/>
+            <a:off x="3168138" y="2145469"/>
+            <a:ext cx="2256426" cy="605825"/>
           </a:xfrm>
           <a:prstGeom prst="rect">
             <a:avLst/>
@@ -16673,10 +18288,10 @@
       </p:pic>
       <p:pic>
         <p:nvPicPr>
-          <p:cNvPr id="11" name="Grafik 10">
+          <p:cNvPr id="14" name="Grafik 13">
             <a:extLst>
               <a:ext uri="{FF2B5EF4-FFF2-40B4-BE49-F238E27FC236}">
-                <a16:creationId xmlns:a16="http://schemas.microsoft.com/office/drawing/2014/main" id="{24031831-C0A8-7A72-8A43-6521CBAD1155}"/>
+                <a16:creationId xmlns:a16="http://schemas.microsoft.com/office/drawing/2014/main" id="{9F3A445A-876F-4EC8-AB61-4ADA98F23DA5}"/>
               </a:ext>
             </a:extLst>
           </p:cNvPr>
@@ -16693,8 +18308,8 @@
         </p:blipFill>
         <p:spPr>
           <a:xfrm>
-            <a:off x="2420092" y="3450534"/>
-            <a:ext cx="1247949" cy="495369"/>
+            <a:off x="2472292" y="3362006"/>
+            <a:ext cx="942721" cy="514890"/>
           </a:xfrm>
           <a:prstGeom prst="rect">
             <a:avLst/>

</xml_diff>